<commit_message>
[MINOR] documentation + presentation
</commit_message>
<xml_diff>
--- a/Praktikum_Anwendungssystem.pptx
+++ b/Praktikum_Anwendungssystem.pptx
@@ -14,9 +14,10 @@
     <p:sldId id="267" r:id="rId8"/>
     <p:sldId id="268" r:id="rId9"/>
     <p:sldId id="261" r:id="rId10"/>
-    <p:sldId id="262" r:id="rId11"/>
-    <p:sldId id="264" r:id="rId12"/>
-    <p:sldId id="269" r:id="rId13"/>
+    <p:sldId id="270" r:id="rId11"/>
+    <p:sldId id="262" r:id="rId12"/>
+    <p:sldId id="264" r:id="rId13"/>
+    <p:sldId id="269" r:id="rId14"/>
   </p:sldIdLst>
   <p:sldSz cx="12192000" cy="6858000"/>
   <p:notesSz cx="6858000" cy="9144000"/>
@@ -4000,6 +4001,1043 @@
       </p:grpSpPr>
       <p:sp>
         <p:nvSpPr>
+          <p:cNvPr id="2" name="Title 1">
+            <a:extLst>
+              <a:ext uri="{FF2B5EF4-FFF2-40B4-BE49-F238E27FC236}">
+                <a16:creationId xmlns:a16="http://schemas.microsoft.com/office/drawing/2014/main" id="{3AFD4DFF-2E42-41B3-8393-652401BD171A}"/>
+              </a:ext>
+            </a:extLst>
+          </p:cNvPr>
+          <p:cNvSpPr>
+            <a:spLocks noGrp="1"/>
+          </p:cNvSpPr>
+          <p:nvPr>
+            <p:ph type="title"/>
+          </p:nvPr>
+        </p:nvSpPr>
+        <p:spPr/>
+        <p:txBody>
+          <a:bodyPr/>
+          <a:lstStyle/>
+          <a:p>
+            <a:r>
+              <a:rPr lang="de-DE" dirty="0"/>
+              <a:t>6. Besonderheit in unserem Projekt</a:t>
+            </a:r>
+          </a:p>
+        </p:txBody>
+      </p:sp>
+      <p:sp>
+        <p:nvSpPr>
+          <p:cNvPr id="3" name="Content Placeholder 2">
+            <a:extLst>
+              <a:ext uri="{FF2B5EF4-FFF2-40B4-BE49-F238E27FC236}">
+                <a16:creationId xmlns:a16="http://schemas.microsoft.com/office/drawing/2014/main" id="{49B947C7-B8A6-42E1-886A-3EDFEE42A2C2}"/>
+              </a:ext>
+            </a:extLst>
+          </p:cNvPr>
+          <p:cNvSpPr>
+            <a:spLocks noGrp="1"/>
+          </p:cNvSpPr>
+          <p:nvPr>
+            <p:ph idx="1"/>
+          </p:nvPr>
+        </p:nvSpPr>
+        <p:spPr>
+          <a:xfrm>
+            <a:off x="1371600" y="1642369"/>
+            <a:ext cx="9601200" cy="4225031"/>
+          </a:xfrm>
+        </p:spPr>
+        <p:txBody>
+          <a:bodyPr/>
+          <a:lstStyle/>
+          <a:p>
+            <a:r>
+              <a:rPr lang="de-DE" sz="1800" dirty="0">
+                <a:effectLst/>
+                <a:latin typeface="Calibri" panose="020F0502020204030204" pitchFamily="34" charset="0"/>
+                <a:ea typeface="AR PL SungtiL GB"/>
+              </a:rPr>
+              <a:t>Die Möglichkeit neue Skripte und Übungen einfach hinzufügen</a:t>
+            </a:r>
+          </a:p>
+          <a:p>
+            <a:pPr lvl="1">
+              <a:buFont typeface="+mj-lt"/>
+              <a:buAutoNum type="arabicPeriod"/>
+            </a:pPr>
+            <a:r>
+              <a:rPr lang="de-DE" sz="1800" dirty="0">
+                <a:latin typeface="Calibri" panose="020F0502020204030204" pitchFamily="34" charset="0"/>
+                <a:ea typeface="AR PL SungtiL GB"/>
+              </a:rPr>
+              <a:t>Hinzufüge eine neue File in der </a:t>
+            </a:r>
+            <a:r>
+              <a:rPr lang="de-DE" sz="1800" dirty="0" err="1">
+                <a:latin typeface="Calibri" panose="020F0502020204030204" pitchFamily="34" charset="0"/>
+                <a:ea typeface="AR PL SungtiL GB"/>
+              </a:rPr>
+              <a:t>html</a:t>
+            </a:r>
+            <a:r>
+              <a:rPr lang="de-DE" sz="1800" dirty="0">
+                <a:latin typeface="Calibri" panose="020F0502020204030204" pitchFamily="34" charset="0"/>
+                <a:ea typeface="AR PL SungtiL GB"/>
+              </a:rPr>
+              <a:t> Verzeichnis</a:t>
+            </a:r>
+          </a:p>
+          <a:p>
+            <a:pPr lvl="1">
+              <a:buFont typeface="+mj-lt"/>
+              <a:buAutoNum type="arabicPeriod"/>
+            </a:pPr>
+            <a:r>
+              <a:rPr lang="de-DE" sz="1800" dirty="0">
+                <a:latin typeface="Calibri" panose="020F0502020204030204" pitchFamily="34" charset="0"/>
+                <a:ea typeface="AR PL SungtiL GB"/>
+              </a:rPr>
+              <a:t>Schreibt der Hinhalte des Skripts</a:t>
+            </a:r>
+          </a:p>
+          <a:p>
+            <a:pPr lvl="1">
+              <a:buFont typeface="+mj-lt"/>
+              <a:buAutoNum type="arabicPeriod"/>
+            </a:pPr>
+            <a:r>
+              <a:rPr lang="de-DE" sz="1800" dirty="0">
+                <a:latin typeface="Calibri" panose="020F0502020204030204" pitchFamily="34" charset="0"/>
+                <a:ea typeface="AR PL SungtiL GB"/>
+              </a:rPr>
+              <a:t>In </a:t>
+            </a:r>
+            <a:r>
+              <a:rPr lang="de-DE" sz="1800" dirty="0" err="1">
+                <a:latin typeface="Calibri" panose="020F0502020204030204" pitchFamily="34" charset="0"/>
+                <a:ea typeface="AR PL SungtiL GB"/>
+              </a:rPr>
+              <a:t>GuiBean</a:t>
+            </a:r>
+            <a:r>
+              <a:rPr lang="de-DE" sz="1800" dirty="0">
+                <a:latin typeface="Calibri" panose="020F0502020204030204" pitchFamily="34" charset="0"/>
+                <a:ea typeface="AR PL SungtiL GB"/>
+              </a:rPr>
+              <a:t> </a:t>
+            </a:r>
+            <a:r>
+              <a:rPr lang="de-DE" sz="1800" dirty="0" err="1">
+                <a:latin typeface="Calibri" panose="020F0502020204030204" pitchFamily="34" charset="0"/>
+                <a:ea typeface="AR PL SungtiL GB"/>
+              </a:rPr>
+              <a:t>erweiter</a:t>
+            </a:r>
+            <a:r>
+              <a:rPr lang="de-DE" sz="1800" dirty="0">
+                <a:latin typeface="Calibri" panose="020F0502020204030204" pitchFamily="34" charset="0"/>
+                <a:ea typeface="AR PL SungtiL GB"/>
+              </a:rPr>
+              <a:t> die Liste</a:t>
+            </a:r>
+            <a:br>
+              <a:rPr lang="de-DE" sz="1800" dirty="0">
+                <a:latin typeface="Calibri" panose="020F0502020204030204" pitchFamily="34" charset="0"/>
+                <a:ea typeface="AR PL SungtiL GB"/>
+              </a:rPr>
+            </a:br>
+            <a:r>
+              <a:rPr lang="de-DE" sz="1800" b="1" dirty="0" err="1">
+                <a:solidFill>
+                  <a:srgbClr val="7F0055"/>
+                </a:solidFill>
+                <a:latin typeface="Consolas" panose="020B0609020204030204" pitchFamily="49" charset="0"/>
+              </a:rPr>
+              <a:t>public</a:t>
+            </a:r>
+            <a:r>
+              <a:rPr lang="de-DE" sz="1800" b="1" dirty="0">
+                <a:solidFill>
+                  <a:srgbClr val="000000"/>
+                </a:solidFill>
+                <a:latin typeface="Consolas" panose="020B0609020204030204" pitchFamily="49" charset="0"/>
+              </a:rPr>
+              <a:t> </a:t>
+            </a:r>
+            <a:r>
+              <a:rPr lang="de-DE" sz="1800" b="1" dirty="0" err="1">
+                <a:solidFill>
+                  <a:srgbClr val="7F0055"/>
+                </a:solidFill>
+                <a:latin typeface="Consolas" panose="020B0609020204030204" pitchFamily="49" charset="0"/>
+              </a:rPr>
+              <a:t>static</a:t>
+            </a:r>
+            <a:r>
+              <a:rPr lang="de-DE" sz="1800" b="1" dirty="0">
+                <a:solidFill>
+                  <a:srgbClr val="000000"/>
+                </a:solidFill>
+                <a:latin typeface="Consolas" panose="020B0609020204030204" pitchFamily="49" charset="0"/>
+              </a:rPr>
+              <a:t> String[] </a:t>
+            </a:r>
+            <a:r>
+              <a:rPr lang="de-DE" sz="1800" b="1" i="1" dirty="0" err="1">
+                <a:solidFill>
+                  <a:srgbClr val="0000C0"/>
+                </a:solidFill>
+                <a:latin typeface="Consolas" panose="020B0609020204030204" pitchFamily="49" charset="0"/>
+              </a:rPr>
+              <a:t>lessonList</a:t>
+            </a:r>
+            <a:endParaRPr lang="de-DE" sz="1800" b="1" i="1" dirty="0">
+              <a:solidFill>
+                <a:srgbClr val="0000C0"/>
+              </a:solidFill>
+              <a:latin typeface="Consolas" panose="020B0609020204030204" pitchFamily="49" charset="0"/>
+            </a:endParaRPr>
+          </a:p>
+          <a:p>
+            <a:pPr marL="530352" lvl="1" indent="0">
+              <a:buNone/>
+            </a:pPr>
+            <a:r>
+              <a:rPr lang="de-DE" sz="1800" b="1" dirty="0">
+                <a:solidFill>
+                  <a:srgbClr val="0000C0"/>
+                </a:solidFill>
+                <a:latin typeface="Consolas" panose="020B0609020204030204" pitchFamily="49" charset="0"/>
+                <a:ea typeface="AR PL SungtiL GB"/>
+              </a:rPr>
+              <a:t>	</a:t>
+            </a:r>
+            <a:r>
+              <a:rPr lang="de-DE" sz="1800" dirty="0">
+                <a:latin typeface="Calibri" panose="020F0502020204030204" pitchFamily="34" charset="0"/>
+                <a:ea typeface="AR PL SungtiL GB"/>
+              </a:rPr>
+              <a:t>mit der Name des neue File</a:t>
+            </a:r>
+            <a:br>
+              <a:rPr lang="de-DE" sz="1800" dirty="0">
+                <a:latin typeface="Calibri" panose="020F0502020204030204" pitchFamily="34" charset="0"/>
+                <a:ea typeface="AR PL SungtiL GB"/>
+              </a:rPr>
+            </a:br>
+            <a:br>
+              <a:rPr lang="de-DE" sz="1800" b="1" dirty="0">
+                <a:solidFill>
+                  <a:srgbClr val="0000C0"/>
+                </a:solidFill>
+                <a:latin typeface="Consolas" panose="020B0609020204030204" pitchFamily="49" charset="0"/>
+                <a:ea typeface="AR PL SungtiL GB"/>
+              </a:rPr>
+            </a:br>
+            <a:endParaRPr lang="de-DE" sz="1800" dirty="0">
+              <a:latin typeface="Calibri" panose="020F0502020204030204" pitchFamily="34" charset="0"/>
+              <a:ea typeface="AR PL SungtiL GB"/>
+            </a:endParaRPr>
+          </a:p>
+          <a:p>
+            <a:pPr lvl="1">
+              <a:buFont typeface="+mj-lt"/>
+              <a:buAutoNum type="arabicPeriod"/>
+            </a:pPr>
+            <a:endParaRPr lang="de-DE" sz="1800" dirty="0">
+              <a:latin typeface="Calibri" panose="020F0502020204030204" pitchFamily="34" charset="0"/>
+              <a:ea typeface="AR PL SungtiL GB"/>
+            </a:endParaRPr>
+          </a:p>
+          <a:p>
+            <a:pPr lvl="1">
+              <a:buFont typeface="+mj-lt"/>
+              <a:buAutoNum type="arabicPeriod"/>
+            </a:pPr>
+            <a:endParaRPr lang="de-DE" sz="1800" dirty="0">
+              <a:effectLst/>
+              <a:latin typeface="Calibri" panose="020F0502020204030204" pitchFamily="34" charset="0"/>
+              <a:ea typeface="AR PL SungtiL GB"/>
+            </a:endParaRPr>
+          </a:p>
+          <a:p>
+            <a:endParaRPr lang="en-DE" dirty="0"/>
+          </a:p>
+        </p:txBody>
+      </p:sp>
+      <p:pic>
+        <p:nvPicPr>
+          <p:cNvPr id="9" name="Picture 8">
+            <a:extLst>
+              <a:ext uri="{FF2B5EF4-FFF2-40B4-BE49-F238E27FC236}">
+                <a16:creationId xmlns:a16="http://schemas.microsoft.com/office/drawing/2014/main" id="{055D6C7E-6946-4E63-AD94-E2A48788EFA8}"/>
+              </a:ext>
+            </a:extLst>
+          </p:cNvPr>
+          <p:cNvPicPr>
+            <a:picLocks noChangeAspect="1"/>
+          </p:cNvPicPr>
+          <p:nvPr/>
+        </p:nvPicPr>
+        <p:blipFill>
+          <a:blip r:embed="rId2"/>
+          <a:stretch>
+            <a:fillRect/>
+          </a:stretch>
+        </p:blipFill>
+        <p:spPr>
+          <a:xfrm>
+            <a:off x="9010184" y="2001395"/>
+            <a:ext cx="2190466" cy="2843212"/>
+          </a:xfrm>
+          <a:prstGeom prst="rect">
+            <a:avLst/>
+          </a:prstGeom>
+        </p:spPr>
+      </p:pic>
+      <p:sp>
+        <p:nvSpPr>
+          <p:cNvPr id="10" name="Rectangle 9">
+            <a:extLst>
+              <a:ext uri="{FF2B5EF4-FFF2-40B4-BE49-F238E27FC236}">
+                <a16:creationId xmlns:a16="http://schemas.microsoft.com/office/drawing/2014/main" id="{28AB93A7-345E-43A2-BF05-88FCFEF511E7}"/>
+              </a:ext>
+            </a:extLst>
+          </p:cNvPr>
+          <p:cNvSpPr/>
+          <p:nvPr/>
+        </p:nvSpPr>
+        <p:spPr>
+          <a:xfrm>
+            <a:off x="9421293" y="4252378"/>
+            <a:ext cx="1012055" cy="168676"/>
+          </a:xfrm>
+          <a:prstGeom prst="rect">
+            <a:avLst/>
+          </a:prstGeom>
+          <a:solidFill>
+            <a:schemeClr val="bg1"/>
+          </a:solidFill>
+          <a:ln>
+            <a:noFill/>
+          </a:ln>
+        </p:spPr>
+        <p:style>
+          <a:lnRef idx="2">
+            <a:schemeClr val="accent1">
+              <a:shade val="50000"/>
+            </a:schemeClr>
+          </a:lnRef>
+          <a:fillRef idx="1">
+            <a:schemeClr val="accent1"/>
+          </a:fillRef>
+          <a:effectRef idx="0">
+            <a:schemeClr val="accent1"/>
+          </a:effectRef>
+          <a:fontRef idx="minor">
+            <a:schemeClr val="lt1"/>
+          </a:fontRef>
+        </p:style>
+        <p:txBody>
+          <a:bodyPr rtlCol="0" anchor="ctr"/>
+          <a:lstStyle/>
+          <a:p>
+            <a:pPr algn="ctr"/>
+            <a:endParaRPr lang="en-DE" dirty="0"/>
+          </a:p>
+        </p:txBody>
+      </p:sp>
+      <p:pic>
+        <p:nvPicPr>
+          <p:cNvPr id="12" name="Picture 11">
+            <a:extLst>
+              <a:ext uri="{FF2B5EF4-FFF2-40B4-BE49-F238E27FC236}">
+                <a16:creationId xmlns:a16="http://schemas.microsoft.com/office/drawing/2014/main" id="{06EBB3F5-51B9-4C90-9C33-E3B8D04A5301}"/>
+              </a:ext>
+            </a:extLst>
+          </p:cNvPr>
+          <p:cNvPicPr>
+            <a:picLocks noChangeAspect="1"/>
+          </p:cNvPicPr>
+          <p:nvPr/>
+        </p:nvPicPr>
+        <p:blipFill>
+          <a:blip r:embed="rId3"/>
+          <a:stretch>
+            <a:fillRect/>
+          </a:stretch>
+        </p:blipFill>
+        <p:spPr>
+          <a:xfrm>
+            <a:off x="7975604" y="3218221"/>
+            <a:ext cx="4081818" cy="2842866"/>
+          </a:xfrm>
+          <a:prstGeom prst="rect">
+            <a:avLst/>
+          </a:prstGeom>
+        </p:spPr>
+      </p:pic>
+      <p:pic>
+        <p:nvPicPr>
+          <p:cNvPr id="5" name="Picture 4">
+            <a:extLst>
+              <a:ext uri="{FF2B5EF4-FFF2-40B4-BE49-F238E27FC236}">
+                <a16:creationId xmlns:a16="http://schemas.microsoft.com/office/drawing/2014/main" id="{D1D4699D-3F8A-4AEB-A253-7D08D8479CD1}"/>
+              </a:ext>
+            </a:extLst>
+          </p:cNvPr>
+          <p:cNvPicPr>
+            <a:picLocks noChangeAspect="1"/>
+          </p:cNvPicPr>
+          <p:nvPr/>
+        </p:nvPicPr>
+        <p:blipFill>
+          <a:blip r:embed="rId4"/>
+          <a:stretch>
+            <a:fillRect/>
+          </a:stretch>
+        </p:blipFill>
+        <p:spPr>
+          <a:xfrm>
+            <a:off x="5867293" y="3670143"/>
+            <a:ext cx="2998078" cy="3090976"/>
+          </a:xfrm>
+          <a:prstGeom prst="rect">
+            <a:avLst/>
+          </a:prstGeom>
+        </p:spPr>
+      </p:pic>
+      <p:pic>
+        <p:nvPicPr>
+          <p:cNvPr id="14" name="Picture 13">
+            <a:extLst>
+              <a:ext uri="{FF2B5EF4-FFF2-40B4-BE49-F238E27FC236}">
+                <a16:creationId xmlns:a16="http://schemas.microsoft.com/office/drawing/2014/main" id="{F3086EB4-0E48-447E-8AB9-4C0B07535DDC}"/>
+              </a:ext>
+            </a:extLst>
+          </p:cNvPr>
+          <p:cNvPicPr>
+            <a:picLocks noChangeAspect="1"/>
+          </p:cNvPicPr>
+          <p:nvPr/>
+        </p:nvPicPr>
+        <p:blipFill>
+          <a:blip r:embed="rId5"/>
+          <a:stretch>
+            <a:fillRect/>
+          </a:stretch>
+        </p:blipFill>
+        <p:spPr>
+          <a:xfrm>
+            <a:off x="3276859" y="4008371"/>
+            <a:ext cx="5172546" cy="2663093"/>
+          </a:xfrm>
+          <a:prstGeom prst="rect">
+            <a:avLst/>
+          </a:prstGeom>
+        </p:spPr>
+      </p:pic>
+      <p:sp>
+        <p:nvSpPr>
+          <p:cNvPr id="15" name="Oval 14">
+            <a:extLst>
+              <a:ext uri="{FF2B5EF4-FFF2-40B4-BE49-F238E27FC236}">
+                <a16:creationId xmlns:a16="http://schemas.microsoft.com/office/drawing/2014/main" id="{ACEA1440-6F23-44E0-B3CB-115A66747441}"/>
+              </a:ext>
+            </a:extLst>
+          </p:cNvPr>
+          <p:cNvSpPr/>
+          <p:nvPr/>
+        </p:nvSpPr>
+        <p:spPr>
+          <a:xfrm>
+            <a:off x="9414501" y="2890371"/>
+            <a:ext cx="1138029" cy="168676"/>
+          </a:xfrm>
+          <a:prstGeom prst="ellipse">
+            <a:avLst/>
+          </a:prstGeom>
+          <a:noFill/>
+          <a:ln w="9525" cap="flat" cmpd="sng" algn="ctr">
+            <a:solidFill>
+              <a:schemeClr val="accent6"/>
+            </a:solidFill>
+            <a:prstDash val="solid"/>
+            <a:round/>
+            <a:headEnd type="none" w="med" len="med"/>
+            <a:tailEnd type="none" w="med" len="med"/>
+          </a:ln>
+        </p:spPr>
+        <p:style>
+          <a:lnRef idx="0">
+            <a:scrgbClr r="0" g="0" b="0"/>
+          </a:lnRef>
+          <a:fillRef idx="0">
+            <a:scrgbClr r="0" g="0" b="0"/>
+          </a:fillRef>
+          <a:effectRef idx="0">
+            <a:scrgbClr r="0" g="0" b="0"/>
+          </a:effectRef>
+          <a:fontRef idx="minor">
+            <a:schemeClr val="accent6"/>
+          </a:fontRef>
+        </p:style>
+        <p:txBody>
+          <a:bodyPr rtlCol="0" anchor="ctr"/>
+          <a:lstStyle/>
+          <a:p>
+            <a:pPr algn="ctr"/>
+            <a:endParaRPr lang="en-DE"/>
+          </a:p>
+        </p:txBody>
+      </p:sp>
+    </p:spTree>
+    <p:extLst>
+      <p:ext uri="{BB962C8B-B14F-4D97-AF65-F5344CB8AC3E}">
+        <p14:creationId xmlns:p14="http://schemas.microsoft.com/office/powerpoint/2010/main" val="299668756"/>
+      </p:ext>
+    </p:extLst>
+  </p:cSld>
+  <p:clrMapOvr>
+    <a:masterClrMapping/>
+  </p:clrMapOvr>
+  <p:timing>
+    <p:tnLst>
+      <p:par>
+        <p:cTn id="1" dur="indefinite" restart="never" nodeType="tmRoot">
+          <p:childTnLst>
+            <p:seq concurrent="1" nextAc="seek">
+              <p:cTn id="2" dur="indefinite" nodeType="mainSeq">
+                <p:childTnLst>
+                  <p:par>
+                    <p:cTn id="3" fill="hold">
+                      <p:stCondLst>
+                        <p:cond delay="indefinite"/>
+                      </p:stCondLst>
+                      <p:childTnLst>
+                        <p:par>
+                          <p:cTn id="4" fill="hold">
+                            <p:stCondLst>
+                              <p:cond delay="0"/>
+                            </p:stCondLst>
+                            <p:childTnLst>
+                              <p:par>
+                                <p:cTn id="5" presetID="1" presetClass="entr" presetSubtype="0" fill="hold" nodeType="clickEffect">
+                                  <p:stCondLst>
+                                    <p:cond delay="0"/>
+                                  </p:stCondLst>
+                                  <p:childTnLst>
+                                    <p:set>
+                                      <p:cBhvr>
+                                        <p:cTn id="6" dur="1" fill="hold">
+                                          <p:stCondLst>
+                                            <p:cond delay="0"/>
+                                          </p:stCondLst>
+                                        </p:cTn>
+                                        <p:tgtEl>
+                                          <p:spTgt spid="3">
+                                            <p:txEl>
+                                              <p:pRg st="0" end="0"/>
+                                            </p:txEl>
+                                          </p:spTgt>
+                                        </p:tgtEl>
+                                        <p:attrNameLst>
+                                          <p:attrName>style.visibility</p:attrName>
+                                        </p:attrNameLst>
+                                      </p:cBhvr>
+                                      <p:to>
+                                        <p:strVal val="visible"/>
+                                      </p:to>
+                                    </p:set>
+                                  </p:childTnLst>
+                                </p:cTn>
+                              </p:par>
+                            </p:childTnLst>
+                          </p:cTn>
+                        </p:par>
+                      </p:childTnLst>
+                    </p:cTn>
+                  </p:par>
+                  <p:par>
+                    <p:cTn id="7" fill="hold">
+                      <p:stCondLst>
+                        <p:cond delay="indefinite"/>
+                      </p:stCondLst>
+                      <p:childTnLst>
+                        <p:par>
+                          <p:cTn id="8" fill="hold">
+                            <p:stCondLst>
+                              <p:cond delay="0"/>
+                            </p:stCondLst>
+                            <p:childTnLst>
+                              <p:par>
+                                <p:cTn id="9" presetID="1" presetClass="entr" presetSubtype="0" fill="hold" nodeType="clickEffect">
+                                  <p:stCondLst>
+                                    <p:cond delay="0"/>
+                                  </p:stCondLst>
+                                  <p:childTnLst>
+                                    <p:set>
+                                      <p:cBhvr>
+                                        <p:cTn id="10" dur="1" fill="hold">
+                                          <p:stCondLst>
+                                            <p:cond delay="0"/>
+                                          </p:stCondLst>
+                                        </p:cTn>
+                                        <p:tgtEl>
+                                          <p:spTgt spid="9"/>
+                                        </p:tgtEl>
+                                        <p:attrNameLst>
+                                          <p:attrName>style.visibility</p:attrName>
+                                        </p:attrNameLst>
+                                      </p:cBhvr>
+                                      <p:to>
+                                        <p:strVal val="visible"/>
+                                      </p:to>
+                                    </p:set>
+                                  </p:childTnLst>
+                                </p:cTn>
+                              </p:par>
+                            </p:childTnLst>
+                          </p:cTn>
+                        </p:par>
+                      </p:childTnLst>
+                    </p:cTn>
+                  </p:par>
+                  <p:par>
+                    <p:cTn id="11" fill="hold">
+                      <p:stCondLst>
+                        <p:cond delay="indefinite"/>
+                      </p:stCondLst>
+                      <p:childTnLst>
+                        <p:par>
+                          <p:cTn id="12" fill="hold">
+                            <p:stCondLst>
+                              <p:cond delay="0"/>
+                            </p:stCondLst>
+                            <p:childTnLst>
+                              <p:par>
+                                <p:cTn id="13" presetID="1" presetClass="entr" presetSubtype="0" fill="hold" nodeType="clickEffect">
+                                  <p:stCondLst>
+                                    <p:cond delay="0"/>
+                                  </p:stCondLst>
+                                  <p:childTnLst>
+                                    <p:set>
+                                      <p:cBhvr>
+                                        <p:cTn id="14" dur="1" fill="hold">
+                                          <p:stCondLst>
+                                            <p:cond delay="0"/>
+                                          </p:stCondLst>
+                                        </p:cTn>
+                                        <p:tgtEl>
+                                          <p:spTgt spid="3">
+                                            <p:txEl>
+                                              <p:pRg st="1" end="1"/>
+                                            </p:txEl>
+                                          </p:spTgt>
+                                        </p:tgtEl>
+                                        <p:attrNameLst>
+                                          <p:attrName>style.visibility</p:attrName>
+                                        </p:attrNameLst>
+                                      </p:cBhvr>
+                                      <p:to>
+                                        <p:strVal val="visible"/>
+                                      </p:to>
+                                    </p:set>
+                                  </p:childTnLst>
+                                </p:cTn>
+                              </p:par>
+                            </p:childTnLst>
+                          </p:cTn>
+                        </p:par>
+                      </p:childTnLst>
+                    </p:cTn>
+                  </p:par>
+                  <p:par>
+                    <p:cTn id="15" fill="hold">
+                      <p:stCondLst>
+                        <p:cond delay="indefinite"/>
+                      </p:stCondLst>
+                      <p:childTnLst>
+                        <p:par>
+                          <p:cTn id="16" fill="hold">
+                            <p:stCondLst>
+                              <p:cond delay="0"/>
+                            </p:stCondLst>
+                            <p:childTnLst>
+                              <p:par>
+                                <p:cTn id="17" presetID="1" presetClass="exit" presetSubtype="0" fill="hold" grpId="0" nodeType="clickEffect">
+                                  <p:stCondLst>
+                                    <p:cond delay="0"/>
+                                  </p:stCondLst>
+                                  <p:childTnLst>
+                                    <p:set>
+                                      <p:cBhvr>
+                                        <p:cTn id="18" dur="1" fill="hold">
+                                          <p:stCondLst>
+                                            <p:cond delay="0"/>
+                                          </p:stCondLst>
+                                        </p:cTn>
+                                        <p:tgtEl>
+                                          <p:spTgt spid="10"/>
+                                        </p:tgtEl>
+                                        <p:attrNameLst>
+                                          <p:attrName>style.visibility</p:attrName>
+                                        </p:attrNameLst>
+                                      </p:cBhvr>
+                                      <p:to>
+                                        <p:strVal val="hidden"/>
+                                      </p:to>
+                                    </p:set>
+                                  </p:childTnLst>
+                                </p:cTn>
+                              </p:par>
+                            </p:childTnLst>
+                          </p:cTn>
+                        </p:par>
+                      </p:childTnLst>
+                    </p:cTn>
+                  </p:par>
+                  <p:par>
+                    <p:cTn id="19" fill="hold">
+                      <p:stCondLst>
+                        <p:cond delay="indefinite"/>
+                      </p:stCondLst>
+                      <p:childTnLst>
+                        <p:par>
+                          <p:cTn id="20" fill="hold">
+                            <p:stCondLst>
+                              <p:cond delay="0"/>
+                            </p:stCondLst>
+                            <p:childTnLst>
+                              <p:par>
+                                <p:cTn id="21" presetID="1" presetClass="entr" presetSubtype="0" fill="hold" nodeType="clickEffect">
+                                  <p:stCondLst>
+                                    <p:cond delay="0"/>
+                                  </p:stCondLst>
+                                  <p:childTnLst>
+                                    <p:set>
+                                      <p:cBhvr>
+                                        <p:cTn id="22" dur="1" fill="hold">
+                                          <p:stCondLst>
+                                            <p:cond delay="0"/>
+                                          </p:stCondLst>
+                                        </p:cTn>
+                                        <p:tgtEl>
+                                          <p:spTgt spid="3">
+                                            <p:txEl>
+                                              <p:pRg st="2" end="2"/>
+                                            </p:txEl>
+                                          </p:spTgt>
+                                        </p:tgtEl>
+                                        <p:attrNameLst>
+                                          <p:attrName>style.visibility</p:attrName>
+                                        </p:attrNameLst>
+                                      </p:cBhvr>
+                                      <p:to>
+                                        <p:strVal val="visible"/>
+                                      </p:to>
+                                    </p:set>
+                                  </p:childTnLst>
+                                </p:cTn>
+                              </p:par>
+                            </p:childTnLst>
+                          </p:cTn>
+                        </p:par>
+                      </p:childTnLst>
+                    </p:cTn>
+                  </p:par>
+                  <p:par>
+                    <p:cTn id="23" fill="hold">
+                      <p:stCondLst>
+                        <p:cond delay="indefinite"/>
+                      </p:stCondLst>
+                      <p:childTnLst>
+                        <p:par>
+                          <p:cTn id="24" fill="hold">
+                            <p:stCondLst>
+                              <p:cond delay="0"/>
+                            </p:stCondLst>
+                            <p:childTnLst>
+                              <p:par>
+                                <p:cTn id="25" presetID="1" presetClass="entr" presetSubtype="0" fill="hold" nodeType="clickEffect">
+                                  <p:stCondLst>
+                                    <p:cond delay="0"/>
+                                  </p:stCondLst>
+                                  <p:childTnLst>
+                                    <p:set>
+                                      <p:cBhvr>
+                                        <p:cTn id="26" dur="1" fill="hold">
+                                          <p:stCondLst>
+                                            <p:cond delay="0"/>
+                                          </p:stCondLst>
+                                        </p:cTn>
+                                        <p:tgtEl>
+                                          <p:spTgt spid="12"/>
+                                        </p:tgtEl>
+                                        <p:attrNameLst>
+                                          <p:attrName>style.visibility</p:attrName>
+                                        </p:attrNameLst>
+                                      </p:cBhvr>
+                                      <p:to>
+                                        <p:strVal val="visible"/>
+                                      </p:to>
+                                    </p:set>
+                                  </p:childTnLst>
+                                </p:cTn>
+                              </p:par>
+                              <p:par>
+                                <p:cTn id="27" presetID="1" presetClass="entr" presetSubtype="0" fill="hold" grpId="0" nodeType="withEffect">
+                                  <p:stCondLst>
+                                    <p:cond delay="0"/>
+                                  </p:stCondLst>
+                                  <p:childTnLst>
+                                    <p:set>
+                                      <p:cBhvr>
+                                        <p:cTn id="28" dur="1" fill="hold">
+                                          <p:stCondLst>
+                                            <p:cond delay="0"/>
+                                          </p:stCondLst>
+                                        </p:cTn>
+                                        <p:tgtEl>
+                                          <p:spTgt spid="15"/>
+                                        </p:tgtEl>
+                                        <p:attrNameLst>
+                                          <p:attrName>style.visibility</p:attrName>
+                                        </p:attrNameLst>
+                                      </p:cBhvr>
+                                      <p:to>
+                                        <p:strVal val="visible"/>
+                                      </p:to>
+                                    </p:set>
+                                  </p:childTnLst>
+                                </p:cTn>
+                              </p:par>
+                            </p:childTnLst>
+                          </p:cTn>
+                        </p:par>
+                      </p:childTnLst>
+                    </p:cTn>
+                  </p:par>
+                  <p:par>
+                    <p:cTn id="29" fill="hold">
+                      <p:stCondLst>
+                        <p:cond delay="indefinite"/>
+                      </p:stCondLst>
+                      <p:childTnLst>
+                        <p:par>
+                          <p:cTn id="30" fill="hold">
+                            <p:stCondLst>
+                              <p:cond delay="0"/>
+                            </p:stCondLst>
+                            <p:childTnLst>
+                              <p:par>
+                                <p:cTn id="31" presetID="1" presetClass="entr" presetSubtype="0" fill="hold" nodeType="clickEffect">
+                                  <p:stCondLst>
+                                    <p:cond delay="0"/>
+                                  </p:stCondLst>
+                                  <p:childTnLst>
+                                    <p:set>
+                                      <p:cBhvr>
+                                        <p:cTn id="32" dur="1" fill="hold">
+                                          <p:stCondLst>
+                                            <p:cond delay="0"/>
+                                          </p:stCondLst>
+                                        </p:cTn>
+                                        <p:tgtEl>
+                                          <p:spTgt spid="3">
+                                            <p:txEl>
+                                              <p:pRg st="3" end="3"/>
+                                            </p:txEl>
+                                          </p:spTgt>
+                                        </p:tgtEl>
+                                        <p:attrNameLst>
+                                          <p:attrName>style.visibility</p:attrName>
+                                        </p:attrNameLst>
+                                      </p:cBhvr>
+                                      <p:to>
+                                        <p:strVal val="visible"/>
+                                      </p:to>
+                                    </p:set>
+                                  </p:childTnLst>
+                                </p:cTn>
+                              </p:par>
+                              <p:par>
+                                <p:cTn id="33" presetID="1" presetClass="entr" presetSubtype="0" fill="hold" nodeType="withEffect">
+                                  <p:stCondLst>
+                                    <p:cond delay="0"/>
+                                  </p:stCondLst>
+                                  <p:childTnLst>
+                                    <p:set>
+                                      <p:cBhvr>
+                                        <p:cTn id="34" dur="1" fill="hold">
+                                          <p:stCondLst>
+                                            <p:cond delay="0"/>
+                                          </p:stCondLst>
+                                        </p:cTn>
+                                        <p:tgtEl>
+                                          <p:spTgt spid="3">
+                                            <p:txEl>
+                                              <p:pRg st="4" end="4"/>
+                                            </p:txEl>
+                                          </p:spTgt>
+                                        </p:tgtEl>
+                                        <p:attrNameLst>
+                                          <p:attrName>style.visibility</p:attrName>
+                                        </p:attrNameLst>
+                                      </p:cBhvr>
+                                      <p:to>
+                                        <p:strVal val="visible"/>
+                                      </p:to>
+                                    </p:set>
+                                  </p:childTnLst>
+                                </p:cTn>
+                              </p:par>
+                            </p:childTnLst>
+                          </p:cTn>
+                        </p:par>
+                      </p:childTnLst>
+                    </p:cTn>
+                  </p:par>
+                  <p:par>
+                    <p:cTn id="35" fill="hold">
+                      <p:stCondLst>
+                        <p:cond delay="indefinite"/>
+                      </p:stCondLst>
+                      <p:childTnLst>
+                        <p:par>
+                          <p:cTn id="36" fill="hold">
+                            <p:stCondLst>
+                              <p:cond delay="0"/>
+                            </p:stCondLst>
+                            <p:childTnLst>
+                              <p:par>
+                                <p:cTn id="37" presetID="1" presetClass="entr" presetSubtype="0" fill="hold" nodeType="clickEffect">
+                                  <p:stCondLst>
+                                    <p:cond delay="0"/>
+                                  </p:stCondLst>
+                                  <p:childTnLst>
+                                    <p:set>
+                                      <p:cBhvr>
+                                        <p:cTn id="38" dur="1" fill="hold">
+                                          <p:stCondLst>
+                                            <p:cond delay="0"/>
+                                          </p:stCondLst>
+                                        </p:cTn>
+                                        <p:tgtEl>
+                                          <p:spTgt spid="5"/>
+                                        </p:tgtEl>
+                                        <p:attrNameLst>
+                                          <p:attrName>style.visibility</p:attrName>
+                                        </p:attrNameLst>
+                                      </p:cBhvr>
+                                      <p:to>
+                                        <p:strVal val="visible"/>
+                                      </p:to>
+                                    </p:set>
+                                  </p:childTnLst>
+                                </p:cTn>
+                              </p:par>
+                            </p:childTnLst>
+                          </p:cTn>
+                        </p:par>
+                      </p:childTnLst>
+                    </p:cTn>
+                  </p:par>
+                  <p:par>
+                    <p:cTn id="39" fill="hold">
+                      <p:stCondLst>
+                        <p:cond delay="indefinite"/>
+                      </p:stCondLst>
+                      <p:childTnLst>
+                        <p:par>
+                          <p:cTn id="40" fill="hold">
+                            <p:stCondLst>
+                              <p:cond delay="0"/>
+                            </p:stCondLst>
+                            <p:childTnLst>
+                              <p:par>
+                                <p:cTn id="41" presetID="1" presetClass="entr" presetSubtype="0" fill="hold" nodeType="clickEffect">
+                                  <p:stCondLst>
+                                    <p:cond delay="0"/>
+                                  </p:stCondLst>
+                                  <p:childTnLst>
+                                    <p:set>
+                                      <p:cBhvr>
+                                        <p:cTn id="42" dur="1" fill="hold">
+                                          <p:stCondLst>
+                                            <p:cond delay="0"/>
+                                          </p:stCondLst>
+                                        </p:cTn>
+                                        <p:tgtEl>
+                                          <p:spTgt spid="14"/>
+                                        </p:tgtEl>
+                                        <p:attrNameLst>
+                                          <p:attrName>style.visibility</p:attrName>
+                                        </p:attrNameLst>
+                                      </p:cBhvr>
+                                      <p:to>
+                                        <p:strVal val="visible"/>
+                                      </p:to>
+                                    </p:set>
+                                  </p:childTnLst>
+                                </p:cTn>
+                              </p:par>
+                            </p:childTnLst>
+                          </p:cTn>
+                        </p:par>
+                      </p:childTnLst>
+                    </p:cTn>
+                  </p:par>
+                </p:childTnLst>
+              </p:cTn>
+              <p:prevCondLst>
+                <p:cond evt="onPrev" delay="0">
+                  <p:tgtEl>
+                    <p:sldTgt/>
+                  </p:tgtEl>
+                </p:cond>
+              </p:prevCondLst>
+              <p:nextCondLst>
+                <p:cond evt="onNext" delay="0">
+                  <p:tgtEl>
+                    <p:sldTgt/>
+                  </p:tgtEl>
+                </p:cond>
+              </p:nextCondLst>
+            </p:seq>
+          </p:childTnLst>
+        </p:cTn>
+      </p:par>
+    </p:tnLst>
+    <p:bldLst>
+      <p:bldP spid="10" grpId="0" animBg="1"/>
+      <p:bldP spid="15" grpId="0" animBg="1"/>
+    </p:bldLst>
+  </p:timing>
+</p:sld>
+</file>
+
+<file path=ppt/slides/slide11.xml><?xml version="1.0" encoding="utf-8"?>
+<p:sld xmlns:a="http://schemas.openxmlformats.org/drawingml/2006/main" xmlns:r="http://schemas.openxmlformats.org/officeDocument/2006/relationships" xmlns:p="http://schemas.openxmlformats.org/presentationml/2006/main">
+  <p:cSld>
+    <p:spTree>
+      <p:nvGrpSpPr>
+        <p:cNvPr id="1" name=""/>
+        <p:cNvGrpSpPr/>
+        <p:nvPr/>
+      </p:nvGrpSpPr>
+      <p:grpSpPr>
+        <a:xfrm>
+          <a:off x="0" y="0"/>
+          <a:ext cx="0" cy="0"/>
+          <a:chOff x="0" y="0"/>
+          <a:chExt cx="0" cy="0"/>
+        </a:xfrm>
+      </p:grpSpPr>
+      <p:sp>
+        <p:nvSpPr>
           <p:cNvPr id="2" name="Заголовок 1">
             <a:extLst>
               <a:ext uri="{FF2B5EF4-FFF2-40B4-BE49-F238E27FC236}">
@@ -4028,7 +5066,7 @@
           <a:p>
             <a:r>
               <a:rPr lang="de-DE" dirty="0"/>
-              <a:t>6. Live-Vorführung</a:t>
+              <a:t>7. Live-Vorführung</a:t>
             </a:r>
             <a:endParaRPr lang="ru-UA" dirty="0"/>
           </a:p>
@@ -4087,7 +5125,7 @@
 </p:sld>
 </file>
 
-<file path=ppt/slides/slide11.xml><?xml version="1.0" encoding="utf-8"?>
+<file path=ppt/slides/slide12.xml><?xml version="1.0" encoding="utf-8"?>
 <p:sld xmlns:a="http://schemas.openxmlformats.org/drawingml/2006/main" xmlns:r="http://schemas.openxmlformats.org/officeDocument/2006/relationships" xmlns:p="http://schemas.openxmlformats.org/presentationml/2006/main">
   <p:cSld>
     <p:spTree>
@@ -4134,7 +5172,7 @@
           <a:p>
             <a:r>
               <a:rPr lang="de-DE" dirty="0"/>
-              <a:t>7. </a:t>
+              <a:t>8. </a:t>
             </a:r>
             <a:r>
               <a:rPr lang="de-DE" sz="4400" dirty="0">
@@ -4510,7 +5548,7 @@
 </p:sld>
 </file>
 
-<file path=ppt/slides/slide12.xml><?xml version="1.0" encoding="utf-8"?>
+<file path=ppt/slides/slide13.xml><?xml version="1.0" encoding="utf-8"?>
 <p:sld xmlns:a="http://schemas.openxmlformats.org/drawingml/2006/main" xmlns:r="http://schemas.openxmlformats.org/officeDocument/2006/relationships" xmlns:p="http://schemas.openxmlformats.org/presentationml/2006/main">
   <p:cSld>
     <p:spTree>
@@ -4735,6 +5773,23 @@
               </a:rPr>
               <a:t>Datenspeicherung</a:t>
             </a:r>
+          </a:p>
+          <a:p>
+            <a:pPr marL="342900" indent="-342900">
+              <a:lnSpc>
+                <a:spcPct val="110000"/>
+              </a:lnSpc>
+              <a:buFont typeface="Franklin Gothic Book" panose="020B0503020102020204" pitchFamily="34" charset="0"/>
+              <a:buAutoNum type="arabicPeriod"/>
+            </a:pPr>
+            <a:r>
+              <a:rPr lang="de-DE" sz="2400" dirty="0">
+                <a:latin typeface="Verdana" panose="020B0604030504040204" pitchFamily="34" charset="0"/>
+                <a:ea typeface="Verdana" panose="020B0604030504040204" pitchFamily="34" charset="0"/>
+                <a:cs typeface="Verdana" panose="020B0604030504040204" pitchFamily="34" charset="0"/>
+              </a:rPr>
+              <a:t>Besonderheit in unserem Projekt</a:t>
+            </a:r>
             <a:endParaRPr lang="de-DE" sz="2400" dirty="0">
               <a:effectLst/>
               <a:latin typeface="Verdana" panose="020B0604030504040204" pitchFamily="34" charset="0"/>
@@ -4846,7 +5901,7 @@
                             </p:stCondLst>
                             <p:childTnLst>
                               <p:par>
-                                <p:cTn id="5" presetID="1" presetClass="entr" presetSubtype="0" fill="hold" grpId="0" nodeType="clickEffect">
+                                <p:cTn id="5" presetID="1" presetClass="entr" presetSubtype="0" fill="hold" nodeType="clickEffect">
                                   <p:stCondLst>
                                     <p:cond delay="0"/>
                                   </p:stCondLst>
@@ -4859,7 +5914,11 @@
                                           </p:stCondLst>
                                         </p:cTn>
                                         <p:tgtEl>
-                                          <p:spTgt spid="2"/>
+                                          <p:spTgt spid="3">
+                                            <p:txEl>
+                                              <p:pRg st="0" end="0"/>
+                                            </p:txEl>
+                                          </p:spTgt>
                                         </p:tgtEl>
                                         <p:attrNameLst>
                                           <p:attrName>style.visibility</p:attrName>
@@ -4872,26 +5931,39 @@
                                   </p:childTnLst>
                                 </p:cTn>
                               </p:par>
-                            </p:childTnLst>
-                          </p:cTn>
-                        </p:par>
-                      </p:childTnLst>
-                    </p:cTn>
-                  </p:par>
-                  <p:par>
-                    <p:cTn id="7" fill="hold">
-                      <p:stCondLst>
-                        <p:cond delay="indefinite"/>
-                      </p:stCondLst>
-                      <p:childTnLst>
-                        <p:par>
-                          <p:cTn id="8" fill="hold">
-                            <p:stCondLst>
-                              <p:cond delay="0"/>
-                            </p:stCondLst>
-                            <p:childTnLst>
                               <p:par>
-                                <p:cTn id="9" presetID="1" presetClass="entr" presetSubtype="0" fill="hold" nodeType="clickEffect">
+                                <p:cTn id="7" presetID="1" presetClass="entr" presetSubtype="0" fill="hold" nodeType="withEffect">
+                                  <p:stCondLst>
+                                    <p:cond delay="0"/>
+                                  </p:stCondLst>
+                                  <p:childTnLst>
+                                    <p:set>
+                                      <p:cBhvr>
+                                        <p:cTn id="8" dur="1" fill="hold">
+                                          <p:stCondLst>
+                                            <p:cond delay="0"/>
+                                          </p:stCondLst>
+                                        </p:cTn>
+                                        <p:tgtEl>
+                                          <p:spTgt spid="3">
+                                            <p:txEl>
+                                              <p:pRg st="1" end="1"/>
+                                            </p:txEl>
+                                          </p:spTgt>
+                                        </p:tgtEl>
+                                        <p:attrNameLst>
+                                          <p:attrName>style.visibility</p:attrName>
+                                        </p:attrNameLst>
+                                      </p:cBhvr>
+                                      <p:to>
+                                        <p:strVal val="visible"/>
+                                      </p:to>
+                                    </p:set>
+                                  </p:childTnLst>
+                                </p:cTn>
+                              </p:par>
+                              <p:par>
+                                <p:cTn id="9" presetID="1" presetClass="entr" presetSubtype="0" fill="hold" nodeType="withEffect">
                                   <p:stCondLst>
                                     <p:cond delay="0"/>
                                   </p:stCondLst>
@@ -4906,7 +5978,7 @@
                                         <p:tgtEl>
                                           <p:spTgt spid="3">
                                             <p:txEl>
-                                              <p:pRg st="0" end="0"/>
+                                              <p:pRg st="2" end="2"/>
                                             </p:txEl>
                                           </p:spTgt>
                                         </p:tgtEl>
@@ -4937,7 +6009,7 @@
                                         <p:tgtEl>
                                           <p:spTgt spid="3">
                                             <p:txEl>
-                                              <p:pRg st="1" end="1"/>
+                                              <p:pRg st="3" end="3"/>
                                             </p:txEl>
                                           </p:spTgt>
                                         </p:tgtEl>
@@ -4968,7 +6040,7 @@
                                         <p:tgtEl>
                                           <p:spTgt spid="3">
                                             <p:txEl>
-                                              <p:pRg st="2" end="2"/>
+                                              <p:pRg st="4" end="4"/>
                                             </p:txEl>
                                           </p:spTgt>
                                         </p:tgtEl>
@@ -4999,7 +6071,7 @@
                                         <p:tgtEl>
                                           <p:spTgt spid="3">
                                             <p:txEl>
-                                              <p:pRg st="3" end="3"/>
+                                              <p:pRg st="5" end="5"/>
                                             </p:txEl>
                                           </p:spTgt>
                                         </p:tgtEl>
@@ -5030,7 +6102,7 @@
                                         <p:tgtEl>
                                           <p:spTgt spid="3">
                                             <p:txEl>
-                                              <p:pRg st="4" end="4"/>
+                                              <p:pRg st="6" end="6"/>
                                             </p:txEl>
                                           </p:spTgt>
                                         </p:tgtEl>
@@ -5061,38 +6133,7 @@
                                         <p:tgtEl>
                                           <p:spTgt spid="3">
                                             <p:txEl>
-                                              <p:pRg st="5" end="5"/>
-                                            </p:txEl>
-                                          </p:spTgt>
-                                        </p:tgtEl>
-                                        <p:attrNameLst>
-                                          <p:attrName>style.visibility</p:attrName>
-                                        </p:attrNameLst>
-                                      </p:cBhvr>
-                                      <p:to>
-                                        <p:strVal val="visible"/>
-                                      </p:to>
-                                    </p:set>
-                                  </p:childTnLst>
-                                </p:cTn>
-                              </p:par>
-                              <p:par>
-                                <p:cTn id="21" presetID="1" presetClass="entr" presetSubtype="0" fill="hold" nodeType="withEffect">
-                                  <p:stCondLst>
-                                    <p:cond delay="0"/>
-                                  </p:stCondLst>
-                                  <p:childTnLst>
-                                    <p:set>
-                                      <p:cBhvr>
-                                        <p:cTn id="22" dur="1" fill="hold">
-                                          <p:stCondLst>
-                                            <p:cond delay="0"/>
-                                          </p:stCondLst>
-                                        </p:cTn>
-                                        <p:tgtEl>
-                                          <p:spTgt spid="3">
-                                            <p:txEl>
-                                              <p:pRg st="6" end="6"/>
+                                              <p:pRg st="7" end="7"/>
                                             </p:txEl>
                                           </p:spTgt>
                                         </p:tgtEl>
@@ -5134,9 +6175,6 @@
         </p:cTn>
       </p:par>
     </p:tnLst>
-    <p:bldLst>
-      <p:bldP spid="2" grpId="0"/>
-    </p:bldLst>
   </p:timing>
 </p:sld>
 </file>
@@ -5411,7 +6449,7 @@
                             </p:stCondLst>
                             <p:childTnLst>
                               <p:par>
-                                <p:cTn id="5" presetID="1" presetClass="entr" presetSubtype="0" fill="hold" grpId="0" nodeType="clickEffect">
+                                <p:cTn id="5" presetID="1" presetClass="entr" presetSubtype="0" fill="hold" nodeType="clickEffect">
                                   <p:stCondLst>
                                     <p:cond delay="0"/>
                                   </p:stCondLst>
@@ -5424,7 +6462,11 @@
                                           </p:stCondLst>
                                         </p:cTn>
                                         <p:tgtEl>
-                                          <p:spTgt spid="2"/>
+                                          <p:spTgt spid="3">
+                                            <p:txEl>
+                                              <p:pRg st="0" end="0"/>
+                                            </p:txEl>
+                                          </p:spTgt>
                                         </p:tgtEl>
                                         <p:attrNameLst>
                                           <p:attrName>style.visibility</p:attrName>
@@ -5437,26 +6479,39 @@
                                   </p:childTnLst>
                                 </p:cTn>
                               </p:par>
-                            </p:childTnLst>
-                          </p:cTn>
-                        </p:par>
-                      </p:childTnLst>
-                    </p:cTn>
-                  </p:par>
-                  <p:par>
-                    <p:cTn id="7" fill="hold">
-                      <p:stCondLst>
-                        <p:cond delay="indefinite"/>
-                      </p:stCondLst>
-                      <p:childTnLst>
-                        <p:par>
-                          <p:cTn id="8" fill="hold">
-                            <p:stCondLst>
-                              <p:cond delay="0"/>
-                            </p:stCondLst>
-                            <p:childTnLst>
                               <p:par>
-                                <p:cTn id="9" presetID="1" presetClass="entr" presetSubtype="0" fill="hold" nodeType="clickEffect">
+                                <p:cTn id="7" presetID="1" presetClass="entr" presetSubtype="0" fill="hold" nodeType="withEffect">
+                                  <p:stCondLst>
+                                    <p:cond delay="0"/>
+                                  </p:stCondLst>
+                                  <p:childTnLst>
+                                    <p:set>
+                                      <p:cBhvr>
+                                        <p:cTn id="8" dur="1" fill="hold">
+                                          <p:stCondLst>
+                                            <p:cond delay="0"/>
+                                          </p:stCondLst>
+                                        </p:cTn>
+                                        <p:tgtEl>
+                                          <p:spTgt spid="3">
+                                            <p:txEl>
+                                              <p:pRg st="1" end="1"/>
+                                            </p:txEl>
+                                          </p:spTgt>
+                                        </p:tgtEl>
+                                        <p:attrNameLst>
+                                          <p:attrName>style.visibility</p:attrName>
+                                        </p:attrNameLst>
+                                      </p:cBhvr>
+                                      <p:to>
+                                        <p:strVal val="visible"/>
+                                      </p:to>
+                                    </p:set>
+                                  </p:childTnLst>
+                                </p:cTn>
+                              </p:par>
+                              <p:par>
+                                <p:cTn id="9" presetID="1" presetClass="entr" presetSubtype="0" fill="hold" nodeType="withEffect">
                                   <p:stCondLst>
                                     <p:cond delay="0"/>
                                   </p:stCondLst>
@@ -5471,7 +6526,7 @@
                                         <p:tgtEl>
                                           <p:spTgt spid="3">
                                             <p:txEl>
-                                              <p:pRg st="0" end="0"/>
+                                              <p:pRg st="2" end="2"/>
                                             </p:txEl>
                                           </p:spTgt>
                                         </p:tgtEl>
@@ -5502,7 +6557,7 @@
                                         <p:tgtEl>
                                           <p:spTgt spid="3">
                                             <p:txEl>
-                                              <p:pRg st="1" end="1"/>
+                                              <p:pRg st="4" end="4"/>
                                             </p:txEl>
                                           </p:spTgt>
                                         </p:tgtEl>
@@ -5533,7 +6588,7 @@
                                         <p:tgtEl>
                                           <p:spTgt spid="3">
                                             <p:txEl>
-                                              <p:pRg st="2" end="2"/>
+                                              <p:pRg st="5" end="5"/>
                                             </p:txEl>
                                           </p:spTgt>
                                         </p:tgtEl>
@@ -5564,7 +6619,7 @@
                                         <p:tgtEl>
                                           <p:spTgt spid="3">
                                             <p:txEl>
-                                              <p:pRg st="4" end="4"/>
+                                              <p:pRg st="6" end="6"/>
                                             </p:txEl>
                                           </p:spTgt>
                                         </p:tgtEl>
@@ -5595,7 +6650,7 @@
                                         <p:tgtEl>
                                           <p:spTgt spid="3">
                                             <p:txEl>
-                                              <p:pRg st="5" end="5"/>
+                                              <p:pRg st="7" end="7"/>
                                             </p:txEl>
                                           </p:spTgt>
                                         </p:tgtEl>
@@ -5619,68 +6674,6 @@
                                     <p:set>
                                       <p:cBhvr>
                                         <p:cTn id="20" dur="1" fill="hold">
-                                          <p:stCondLst>
-                                            <p:cond delay="0"/>
-                                          </p:stCondLst>
-                                        </p:cTn>
-                                        <p:tgtEl>
-                                          <p:spTgt spid="3">
-                                            <p:txEl>
-                                              <p:pRg st="6" end="6"/>
-                                            </p:txEl>
-                                          </p:spTgt>
-                                        </p:tgtEl>
-                                        <p:attrNameLst>
-                                          <p:attrName>style.visibility</p:attrName>
-                                        </p:attrNameLst>
-                                      </p:cBhvr>
-                                      <p:to>
-                                        <p:strVal val="visible"/>
-                                      </p:to>
-                                    </p:set>
-                                  </p:childTnLst>
-                                </p:cTn>
-                              </p:par>
-                              <p:par>
-                                <p:cTn id="21" presetID="1" presetClass="entr" presetSubtype="0" fill="hold" nodeType="withEffect">
-                                  <p:stCondLst>
-                                    <p:cond delay="0"/>
-                                  </p:stCondLst>
-                                  <p:childTnLst>
-                                    <p:set>
-                                      <p:cBhvr>
-                                        <p:cTn id="22" dur="1" fill="hold">
-                                          <p:stCondLst>
-                                            <p:cond delay="0"/>
-                                          </p:stCondLst>
-                                        </p:cTn>
-                                        <p:tgtEl>
-                                          <p:spTgt spid="3">
-                                            <p:txEl>
-                                              <p:pRg st="7" end="7"/>
-                                            </p:txEl>
-                                          </p:spTgt>
-                                        </p:tgtEl>
-                                        <p:attrNameLst>
-                                          <p:attrName>style.visibility</p:attrName>
-                                        </p:attrNameLst>
-                                      </p:cBhvr>
-                                      <p:to>
-                                        <p:strVal val="visible"/>
-                                      </p:to>
-                                    </p:set>
-                                  </p:childTnLst>
-                                </p:cTn>
-                              </p:par>
-                              <p:par>
-                                <p:cTn id="23" presetID="1" presetClass="entr" presetSubtype="0" fill="hold" nodeType="withEffect">
-                                  <p:stCondLst>
-                                    <p:cond delay="0"/>
-                                  </p:stCondLst>
-                                  <p:childTnLst>
-                                    <p:set>
-                                      <p:cBhvr>
-                                        <p:cTn id="24" dur="1" fill="hold">
                                           <p:stCondLst>
                                             <p:cond delay="0"/>
                                           </p:stCondLst>
@@ -5730,9 +6723,6 @@
         </p:cTn>
       </p:par>
     </p:tnLst>
-    <p:bldLst>
-      <p:bldP spid="2" grpId="0"/>
-    </p:bldLst>
   </p:timing>
 </p:sld>
 </file>
@@ -8890,7 +9880,7 @@
                             </p:stCondLst>
                             <p:childTnLst>
                               <p:par>
-                                <p:cTn id="5" presetID="1" presetClass="entr" presetSubtype="0" fill="hold" grpId="0" nodeType="clickEffect">
+                                <p:cTn id="5" presetID="1" presetClass="entr" presetSubtype="0" fill="hold" nodeType="clickEffect">
                                   <p:stCondLst>
                                     <p:cond delay="0"/>
                                   </p:stCondLst>
@@ -8903,7 +9893,7 @@
                                           </p:stCondLst>
                                         </p:cTn>
                                         <p:tgtEl>
-                                          <p:spTgt spid="2"/>
+                                          <p:spTgt spid="9"/>
                                         </p:tgtEl>
                                         <p:attrNameLst>
                                           <p:attrName>style.visibility</p:attrName>
@@ -8935,7 +9925,7 @@
                             </p:stCondLst>
                             <p:childTnLst>
                               <p:par>
-                                <p:cTn id="9" presetID="1" presetClass="entr" presetSubtype="0" fill="hold" nodeType="clickEffect">
+                                <p:cTn id="9" presetID="21" presetClass="entr" presetSubtype="1" fill="hold" nodeType="clickEffect">
                                   <p:stCondLst>
                                     <p:cond delay="0"/>
                                   </p:stCondLst>
@@ -8943,51 +9933,6 @@
                                     <p:set>
                                       <p:cBhvr>
                                         <p:cTn id="10" dur="1" fill="hold">
-                                          <p:stCondLst>
-                                            <p:cond delay="0"/>
-                                          </p:stCondLst>
-                                        </p:cTn>
-                                        <p:tgtEl>
-                                          <p:spTgt spid="9"/>
-                                        </p:tgtEl>
-                                        <p:attrNameLst>
-                                          <p:attrName>style.visibility</p:attrName>
-                                        </p:attrNameLst>
-                                      </p:cBhvr>
-                                      <p:to>
-                                        <p:strVal val="visible"/>
-                                      </p:to>
-                                    </p:set>
-                                  </p:childTnLst>
-                                </p:cTn>
-                              </p:par>
-                            </p:childTnLst>
-                          </p:cTn>
-                        </p:par>
-                      </p:childTnLst>
-                    </p:cTn>
-                  </p:par>
-                  <p:par>
-                    <p:cTn id="11" fill="hold">
-                      <p:stCondLst>
-                        <p:cond delay="indefinite"/>
-                      </p:stCondLst>
-                      <p:childTnLst>
-                        <p:par>
-                          <p:cTn id="12" fill="hold">
-                            <p:stCondLst>
-                              <p:cond delay="0"/>
-                            </p:stCondLst>
-                            <p:childTnLst>
-                              <p:par>
-                                <p:cTn id="13" presetID="21" presetClass="entr" presetSubtype="1" fill="hold" nodeType="clickEffect">
-                                  <p:stCondLst>
-                                    <p:cond delay="0"/>
-                                  </p:stCondLst>
-                                  <p:childTnLst>
-                                    <p:set>
-                                      <p:cBhvr>
-                                        <p:cTn id="14" dur="1" fill="hold">
                                           <p:stCondLst>
                                             <p:cond delay="0"/>
                                           </p:stCondLst>
@@ -9005,7 +9950,7 @@
                                     </p:set>
                                     <p:animEffect transition="in" filter="wheel(1)">
                                       <p:cBhvr>
-                                        <p:cTn id="15" dur="2000"/>
+                                        <p:cTn id="11" dur="2000"/>
                                         <p:tgtEl>
                                           <p:spTgt spid="11"/>
                                         </p:tgtEl>
@@ -9015,14 +9960,14 @@
                                 </p:cTn>
                               </p:par>
                               <p:par>
-                                <p:cTn id="16" presetID="21" presetClass="entr" presetSubtype="1" fill="hold" nodeType="withEffect">
+                                <p:cTn id="12" presetID="21" presetClass="entr" presetSubtype="1" fill="hold" nodeType="withEffect">
                                   <p:stCondLst>
                                     <p:cond delay="0"/>
                                   </p:stCondLst>
                                   <p:childTnLst>
                                     <p:set>
                                       <p:cBhvr>
-                                        <p:cTn id="17" dur="1" fill="hold">
+                                        <p:cTn id="13" dur="1" fill="hold">
                                           <p:stCondLst>
                                             <p:cond delay="0"/>
                                           </p:stCondLst>
@@ -9040,7 +9985,7 @@
                                     </p:set>
                                     <p:animEffect transition="in" filter="wheel(1)">
                                       <p:cBhvr>
-                                        <p:cTn id="18" dur="2000"/>
+                                        <p:cTn id="14" dur="2000"/>
                                         <p:tgtEl>
                                           <p:spTgt spid="15"/>
                                         </p:tgtEl>
@@ -9050,14 +9995,14 @@
                                 </p:cTn>
                               </p:par>
                               <p:par>
-                                <p:cTn id="19" presetID="21" presetClass="entr" presetSubtype="1" fill="hold" nodeType="withEffect">
+                                <p:cTn id="15" presetID="21" presetClass="entr" presetSubtype="1" fill="hold" nodeType="withEffect">
                                   <p:stCondLst>
                                     <p:cond delay="0"/>
                                   </p:stCondLst>
                                   <p:childTnLst>
                                     <p:set>
                                       <p:cBhvr>
-                                        <p:cTn id="20" dur="1" fill="hold">
+                                        <p:cTn id="16" dur="1" fill="hold">
                                           <p:stCondLst>
                                             <p:cond delay="0"/>
                                           </p:stCondLst>
@@ -9075,7 +10020,7 @@
                                     </p:set>
                                     <p:animEffect transition="in" filter="wheel(1)">
                                       <p:cBhvr>
-                                        <p:cTn id="21" dur="2000"/>
+                                        <p:cTn id="17" dur="2000"/>
                                         <p:tgtEl>
                                           <p:spTgt spid="13"/>
                                         </p:tgtEl>
@@ -9091,26 +10036,26 @@
                     </p:cTn>
                   </p:par>
                   <p:par>
-                    <p:cTn id="22" fill="hold">
+                    <p:cTn id="18" fill="hold">
                       <p:stCondLst>
                         <p:cond delay="indefinite"/>
                       </p:stCondLst>
                       <p:childTnLst>
                         <p:par>
-                          <p:cTn id="23" fill="hold">
+                          <p:cTn id="19" fill="hold">
                             <p:stCondLst>
                               <p:cond delay="0"/>
                             </p:stCondLst>
                             <p:childTnLst>
                               <p:par>
-                                <p:cTn id="24" presetID="1" presetClass="entr" presetSubtype="0" fill="hold" nodeType="clickEffect">
+                                <p:cTn id="20" presetID="1" presetClass="entr" presetSubtype="0" fill="hold" nodeType="clickEffect">
                                   <p:stCondLst>
                                     <p:cond delay="0"/>
                                   </p:stCondLst>
                                   <p:childTnLst>
                                     <p:set>
                                       <p:cBhvr>
-                                        <p:cTn id="25" dur="1" fill="hold">
+                                        <p:cTn id="21" dur="1" fill="hold">
                                           <p:stCondLst>
                                             <p:cond delay="0"/>
                                           </p:stCondLst>
@@ -9136,26 +10081,26 @@
                     </p:cTn>
                   </p:par>
                   <p:par>
-                    <p:cTn id="26" fill="hold">
+                    <p:cTn id="22" fill="hold">
                       <p:stCondLst>
                         <p:cond delay="indefinite"/>
                       </p:stCondLst>
                       <p:childTnLst>
                         <p:par>
-                          <p:cTn id="27" fill="hold">
+                          <p:cTn id="23" fill="hold">
                             <p:stCondLst>
                               <p:cond delay="0"/>
                             </p:stCondLst>
                             <p:childTnLst>
                               <p:par>
-                                <p:cTn id="28" presetID="6" presetClass="entr" presetSubtype="16" fill="hold" grpId="0" nodeType="clickEffect">
+                                <p:cTn id="24" presetID="6" presetClass="entr" presetSubtype="16" fill="hold" grpId="0" nodeType="clickEffect">
                                   <p:stCondLst>
                                     <p:cond delay="0"/>
                                   </p:stCondLst>
                                   <p:childTnLst>
                                     <p:set>
                                       <p:cBhvr>
-                                        <p:cTn id="29" dur="1" fill="hold">
+                                        <p:cTn id="25" dur="1" fill="hold">
                                           <p:stCondLst>
                                             <p:cond delay="0"/>
                                           </p:stCondLst>
@@ -9173,7 +10118,7 @@
                                     </p:set>
                                     <p:animEffect transition="in" filter="circle(in)">
                                       <p:cBhvr>
-                                        <p:cTn id="30" dur="2000"/>
+                                        <p:cTn id="26" dur="2000"/>
                                         <p:tgtEl>
                                           <p:spTgt spid="28"/>
                                         </p:tgtEl>
@@ -9183,14 +10128,14 @@
                                 </p:cTn>
                               </p:par>
                               <p:par>
-                                <p:cTn id="31" presetID="6" presetClass="entr" presetSubtype="16" fill="hold" nodeType="withEffect">
+                                <p:cTn id="27" presetID="6" presetClass="entr" presetSubtype="16" fill="hold" nodeType="withEffect">
                                   <p:stCondLst>
                                     <p:cond delay="0"/>
                                   </p:stCondLst>
                                   <p:childTnLst>
                                     <p:set>
                                       <p:cBhvr>
-                                        <p:cTn id="32" dur="1" fill="hold">
+                                        <p:cTn id="28" dur="1" fill="hold">
                                           <p:stCondLst>
                                             <p:cond delay="0"/>
                                           </p:stCondLst>
@@ -9208,7 +10153,7 @@
                                     </p:set>
                                     <p:animEffect transition="in" filter="circle(in)">
                                       <p:cBhvr>
-                                        <p:cTn id="33" dur="2000"/>
+                                        <p:cTn id="29" dur="2000"/>
                                         <p:tgtEl>
                                           <p:spTgt spid="17"/>
                                         </p:tgtEl>
@@ -9224,26 +10169,26 @@
                     </p:cTn>
                   </p:par>
                   <p:par>
-                    <p:cTn id="34" fill="hold">
+                    <p:cTn id="30" fill="hold">
                       <p:stCondLst>
                         <p:cond delay="indefinite"/>
                       </p:stCondLst>
                       <p:childTnLst>
                         <p:par>
-                          <p:cTn id="35" fill="hold">
+                          <p:cTn id="31" fill="hold">
                             <p:stCondLst>
                               <p:cond delay="0"/>
                             </p:stCondLst>
                             <p:childTnLst>
                               <p:par>
-                                <p:cTn id="36" presetID="21" presetClass="entr" presetSubtype="1" fill="hold" grpId="0" nodeType="clickEffect">
+                                <p:cTn id="32" presetID="21" presetClass="entr" presetSubtype="1" fill="hold" grpId="0" nodeType="clickEffect">
                                   <p:stCondLst>
                                     <p:cond delay="0"/>
                                   </p:stCondLst>
                                   <p:childTnLst>
                                     <p:set>
                                       <p:cBhvr>
-                                        <p:cTn id="37" dur="1" fill="hold">
+                                        <p:cTn id="33" dur="1" fill="hold">
                                           <p:stCondLst>
                                             <p:cond delay="0"/>
                                           </p:stCondLst>
@@ -9261,7 +10206,7 @@
                                     </p:set>
                                     <p:animEffect transition="in" filter="wheel(1)">
                                       <p:cBhvr>
-                                        <p:cTn id="38" dur="2000"/>
+                                        <p:cTn id="34" dur="2000"/>
                                         <p:tgtEl>
                                           <p:spTgt spid="24"/>
                                         </p:tgtEl>
@@ -9271,14 +10216,14 @@
                                 </p:cTn>
                               </p:par>
                               <p:par>
-                                <p:cTn id="39" presetID="21" presetClass="entr" presetSubtype="1" fill="hold" nodeType="withEffect">
+                                <p:cTn id="35" presetID="21" presetClass="entr" presetSubtype="1" fill="hold" nodeType="withEffect">
                                   <p:stCondLst>
                                     <p:cond delay="0"/>
                                   </p:stCondLst>
                                   <p:childTnLst>
                                     <p:set>
                                       <p:cBhvr>
-                                        <p:cTn id="40" dur="1" fill="hold">
+                                        <p:cTn id="36" dur="1" fill="hold">
                                           <p:stCondLst>
                                             <p:cond delay="0"/>
                                           </p:stCondLst>
@@ -9296,7 +10241,7 @@
                                     </p:set>
                                     <p:animEffect transition="in" filter="wheel(1)">
                                       <p:cBhvr>
-                                        <p:cTn id="41" dur="2000"/>
+                                        <p:cTn id="37" dur="2000"/>
                                         <p:tgtEl>
                                           <p:spTgt spid="19"/>
                                         </p:tgtEl>
@@ -9312,26 +10257,26 @@
                     </p:cTn>
                   </p:par>
                   <p:par>
-                    <p:cTn id="42" fill="hold">
+                    <p:cTn id="38" fill="hold">
                       <p:stCondLst>
                         <p:cond delay="indefinite"/>
                       </p:stCondLst>
                       <p:childTnLst>
                         <p:par>
-                          <p:cTn id="43" fill="hold">
+                          <p:cTn id="39" fill="hold">
                             <p:stCondLst>
                               <p:cond delay="0"/>
                             </p:stCondLst>
                             <p:childTnLst>
                               <p:par>
-                                <p:cTn id="44" presetID="21" presetClass="entr" presetSubtype="1" fill="hold" nodeType="clickEffect">
+                                <p:cTn id="40" presetID="21" presetClass="entr" presetSubtype="1" fill="hold" nodeType="clickEffect">
                                   <p:stCondLst>
                                     <p:cond delay="0"/>
                                   </p:stCondLst>
                                   <p:childTnLst>
                                     <p:set>
                                       <p:cBhvr>
-                                        <p:cTn id="45" dur="1" fill="hold">
+                                        <p:cTn id="41" dur="1" fill="hold">
                                           <p:stCondLst>
                                             <p:cond delay="0"/>
                                           </p:stCondLst>
@@ -9349,7 +10294,7 @@
                                     </p:set>
                                     <p:animEffect transition="in" filter="wheel(1)">
                                       <p:cBhvr>
-                                        <p:cTn id="46" dur="2000"/>
+                                        <p:cTn id="42" dur="2000"/>
                                         <p:tgtEl>
                                           <p:spTgt spid="21"/>
                                         </p:tgtEl>
@@ -9359,14 +10304,14 @@
                                 </p:cTn>
                               </p:par>
                               <p:par>
-                                <p:cTn id="47" presetID="21" presetClass="entr" presetSubtype="1" fill="hold" grpId="0" nodeType="withEffect">
+                                <p:cTn id="43" presetID="21" presetClass="entr" presetSubtype="1" fill="hold" grpId="0" nodeType="withEffect">
                                   <p:stCondLst>
                                     <p:cond delay="0"/>
                                   </p:stCondLst>
                                   <p:childTnLst>
                                     <p:set>
                                       <p:cBhvr>
-                                        <p:cTn id="48" dur="1" fill="hold">
+                                        <p:cTn id="44" dur="1" fill="hold">
                                           <p:stCondLst>
                                             <p:cond delay="0"/>
                                           </p:stCondLst>
@@ -9384,7 +10329,7 @@
                                     </p:set>
                                     <p:animEffect transition="in" filter="wheel(1)">
                                       <p:cBhvr>
-                                        <p:cTn id="49" dur="2000"/>
+                                        <p:cTn id="45" dur="2000"/>
                                         <p:tgtEl>
                                           <p:spTgt spid="26"/>
                                         </p:tgtEl>
@@ -9400,26 +10345,26 @@
                     </p:cTn>
                   </p:par>
                   <p:par>
-                    <p:cTn id="50" fill="hold">
+                    <p:cTn id="46" fill="hold">
                       <p:stCondLst>
                         <p:cond delay="indefinite"/>
                       </p:stCondLst>
                       <p:childTnLst>
                         <p:par>
-                          <p:cTn id="51" fill="hold">
+                          <p:cTn id="47" fill="hold">
                             <p:stCondLst>
                               <p:cond delay="0"/>
                             </p:stCondLst>
                             <p:childTnLst>
                               <p:par>
-                                <p:cTn id="52" presetID="21" presetClass="entr" presetSubtype="1" fill="hold" grpId="0" nodeType="clickEffect">
+                                <p:cTn id="48" presetID="21" presetClass="entr" presetSubtype="1" fill="hold" grpId="0" nodeType="clickEffect">
                                   <p:stCondLst>
                                     <p:cond delay="0"/>
                                   </p:stCondLst>
                                   <p:childTnLst>
                                     <p:set>
                                       <p:cBhvr>
-                                        <p:cTn id="53" dur="1" fill="hold">
+                                        <p:cTn id="49" dur="1" fill="hold">
                                           <p:stCondLst>
                                             <p:cond delay="0"/>
                                           </p:stCondLst>
@@ -9437,7 +10382,7 @@
                                     </p:set>
                                     <p:animEffect transition="in" filter="wheel(1)">
                                       <p:cBhvr>
-                                        <p:cTn id="54" dur="2000"/>
+                                        <p:cTn id="50" dur="2000"/>
                                         <p:tgtEl>
                                           <p:spTgt spid="27"/>
                                         </p:tgtEl>
@@ -9447,14 +10392,14 @@
                                 </p:cTn>
                               </p:par>
                               <p:par>
-                                <p:cTn id="55" presetID="21" presetClass="entr" presetSubtype="1" fill="hold" nodeType="withEffect">
+                                <p:cTn id="51" presetID="21" presetClass="entr" presetSubtype="1" fill="hold" nodeType="withEffect">
                                   <p:stCondLst>
                                     <p:cond delay="0"/>
                                   </p:stCondLst>
                                   <p:childTnLst>
                                     <p:set>
                                       <p:cBhvr>
-                                        <p:cTn id="56" dur="1" fill="hold">
+                                        <p:cTn id="52" dur="1" fill="hold">
                                           <p:stCondLst>
                                             <p:cond delay="0"/>
                                           </p:stCondLst>
@@ -9472,7 +10417,7 @@
                                     </p:set>
                                     <p:animEffect transition="in" filter="wheel(1)">
                                       <p:cBhvr>
-                                        <p:cTn id="57" dur="2000"/>
+                                        <p:cTn id="53" dur="2000"/>
                                         <p:tgtEl>
                                           <p:spTgt spid="23"/>
                                         </p:tgtEl>
@@ -9509,7 +10454,6 @@
       </p:par>
     </p:tnLst>
     <p:bldLst>
-      <p:bldP spid="2" grpId="0"/>
       <p:bldP spid="24" grpId="0" animBg="1"/>
       <p:bldP spid="26" grpId="0" animBg="1"/>
       <p:bldP spid="27" grpId="0" animBg="1"/>

</xml_diff>

<commit_message>
[ADD] final version documentation and presentation
</commit_message>
<xml_diff>
--- a/Praktikum_Anwendungssystem.pptx
+++ b/Praktikum_Anwendungssystem.pptx
@@ -4072,7 +4072,7 @@
                 <a:latin typeface="Calibri" panose="020F0502020204030204" pitchFamily="34" charset="0"/>
                 <a:ea typeface="AR PL SungtiL GB"/>
               </a:rPr>
-              <a:t>Hinzufüge eine neue File in der </a:t>
+              <a:t>Füge einen neuen File in das </a:t>
             </a:r>
             <a:r>
               <a:rPr lang="de-DE" sz="1800" dirty="0" err="1">
@@ -4086,7 +4086,7 @@
                 <a:latin typeface="Calibri" panose="020F0502020204030204" pitchFamily="34" charset="0"/>
                 <a:ea typeface="AR PL SungtiL GB"/>
               </a:rPr>
-              <a:t> Verzeichnis</a:t>
+              <a:t> Verzeichnis hinzu</a:t>
             </a:r>
           </a:p>
           <a:p>
@@ -4099,7 +4099,7 @@
                 <a:latin typeface="Calibri" panose="020F0502020204030204" pitchFamily="34" charset="0"/>
                 <a:ea typeface="AR PL SungtiL GB"/>
               </a:rPr>
-              <a:t>Schreibt der Hinhalte des Skripts</a:t>
+              <a:t>Schreib den Inhalt des Skripts</a:t>
             </a:r>
           </a:p>
           <a:p>
@@ -4112,7 +4112,7 @@
                 <a:latin typeface="Calibri" panose="020F0502020204030204" pitchFamily="34" charset="0"/>
                 <a:ea typeface="AR PL SungtiL GB"/>
               </a:rPr>
-              <a:t>In </a:t>
+              <a:t>Erweitere die Liste in </a:t>
             </a:r>
             <a:r>
               <a:rPr lang="de-DE" sz="1800" dirty="0" err="1">
@@ -4127,20 +4127,6 @@
                 <a:ea typeface="AR PL SungtiL GB"/>
               </a:rPr>
               <a:t> </a:t>
-            </a:r>
-            <a:r>
-              <a:rPr lang="de-DE" sz="1800" dirty="0" err="1">
-                <a:latin typeface="Calibri" panose="020F0502020204030204" pitchFamily="34" charset="0"/>
-                <a:ea typeface="AR PL SungtiL GB"/>
-              </a:rPr>
-              <a:t>erweiter</a:t>
-            </a:r>
-            <a:r>
-              <a:rPr lang="de-DE" sz="1800" dirty="0">
-                <a:latin typeface="Calibri" panose="020F0502020204030204" pitchFamily="34" charset="0"/>
-                <a:ea typeface="AR PL SungtiL GB"/>
-              </a:rPr>
-              <a:t> die Liste</a:t>
             </a:r>
             <a:br>
               <a:rPr lang="de-DE" sz="1800" dirty="0">
@@ -4219,7 +4205,7 @@
                 <a:latin typeface="Calibri" panose="020F0502020204030204" pitchFamily="34" charset="0"/>
                 <a:ea typeface="AR PL SungtiL GB"/>
               </a:rPr>
-              <a:t>mit der Name des neue File</a:t>
+              <a:t>mit dem Namen des neuen Files</a:t>
             </a:r>
             <a:br>
               <a:rPr lang="de-DE" sz="1800" dirty="0">
@@ -6317,7 +6303,7 @@
                 <a:ea typeface="Calibri" panose="020F0502020204030204" pitchFamily="34" charset="0"/>
                 <a:cs typeface="Times New Roman" panose="02020603050405020304" pitchFamily="18" charset="0"/>
               </a:rPr>
-              <a:t>Es gibt Theorie, Benotungssystem, Möglichkeit der richtige Antworten zu sehen</a:t>
+              <a:t>Es gibt Theorie, Benotungssystem, Möglichkeit der richtigen Antworten zu sehen</a:t>
             </a:r>
           </a:p>
           <a:p>
@@ -6342,7 +6328,7 @@
                 <a:ea typeface="Calibri" panose="020F0502020204030204" pitchFamily="34" charset="0"/>
                 <a:cs typeface="Times New Roman" panose="02020603050405020304" pitchFamily="18" charset="0"/>
               </a:rPr>
-              <a:t>Vorteilen sind:</a:t>
+              <a:t>Vorteile sind:</a:t>
             </a:r>
           </a:p>
           <a:p>

</xml_diff>